<commit_message>
working on m5 updates
</commit_message>
<xml_diff>
--- a/aspnetcore/slides/05_controllers.pptx
+++ b/aspnetcore/slides/05_controllers.pptx
@@ -5,29 +5,30 @@
     <p:sldMasterId id="2147483772" r:id="rId1"/>
   </p:sldMasterIdLst>
   <p:notesMasterIdLst>
-    <p:notesMasterId r:id="rId19"/>
+    <p:notesMasterId r:id="rId20"/>
   </p:notesMasterIdLst>
   <p:handoutMasterIdLst>
-    <p:handoutMasterId r:id="rId20"/>
+    <p:handoutMasterId r:id="rId21"/>
   </p:handoutMasterIdLst>
   <p:sldIdLst>
     <p:sldId id="327" r:id="rId2"/>
     <p:sldId id="328" r:id="rId3"/>
-    <p:sldId id="329" r:id="rId4"/>
-    <p:sldId id="332" r:id="rId5"/>
-    <p:sldId id="330" r:id="rId6"/>
-    <p:sldId id="331" r:id="rId7"/>
-    <p:sldId id="334" r:id="rId8"/>
-    <p:sldId id="338" r:id="rId9"/>
-    <p:sldId id="333" r:id="rId10"/>
-    <p:sldId id="337" r:id="rId11"/>
-    <p:sldId id="335" r:id="rId12"/>
-    <p:sldId id="336" r:id="rId13"/>
-    <p:sldId id="339" r:id="rId14"/>
-    <p:sldId id="340" r:id="rId15"/>
-    <p:sldId id="342" r:id="rId16"/>
-    <p:sldId id="343" r:id="rId17"/>
-    <p:sldId id="341" r:id="rId18"/>
+    <p:sldId id="344" r:id="rId4"/>
+    <p:sldId id="329" r:id="rId5"/>
+    <p:sldId id="332" r:id="rId6"/>
+    <p:sldId id="330" r:id="rId7"/>
+    <p:sldId id="331" r:id="rId8"/>
+    <p:sldId id="334" r:id="rId9"/>
+    <p:sldId id="338" r:id="rId10"/>
+    <p:sldId id="333" r:id="rId11"/>
+    <p:sldId id="337" r:id="rId12"/>
+    <p:sldId id="335" r:id="rId13"/>
+    <p:sldId id="336" r:id="rId14"/>
+    <p:sldId id="339" r:id="rId15"/>
+    <p:sldId id="340" r:id="rId16"/>
+    <p:sldId id="342" r:id="rId17"/>
+    <p:sldId id="343" r:id="rId18"/>
+    <p:sldId id="341" r:id="rId19"/>
   </p:sldIdLst>
   <p:sldSz cx="9144000" cy="6858000" type="screen4x3"/>
   <p:notesSz cx="7302500" cy="9588500"/>
@@ -163,6 +164,7 @@
           <p14:sldIdLst>
             <p14:sldId id="327"/>
             <p14:sldId id="328"/>
+            <p14:sldId id="344"/>
             <p14:sldId id="329"/>
             <p14:sldId id="332"/>
             <p14:sldId id="330"/>
@@ -305,7 +307,7 @@
               <a:pPr>
                 <a:defRPr/>
               </a:pPr>
-              <a:t>10/23/2018</a:t>
+              <a:t>8/31/2019</a:t>
             </a:fld>
             <a:endParaRPr lang="en-US"/>
           </a:p>
@@ -1112,7 +1114,7 @@
               <a:pPr>
                 <a:defRPr/>
               </a:pPr>
-              <a:t>4</a:t>
+              <a:t>5</a:t>
             </a:fld>
             <a:endParaRPr lang="en-US"/>
           </a:p>
@@ -2916,7 +2918,7 @@
             <a:pPr marL="0" indent="0" defTabSz="914400" eaLnBrk="1" hangingPunct="1"/>
             <a:r>
               <a:rPr lang="en-US" dirty="0"/>
-              <a:t>ASP.NET Core MVC</a:t>
+              <a:t>ASP.NET Core Controllers</a:t>
             </a:r>
           </a:p>
         </p:txBody>
@@ -2956,6 +2958,127 @@
 </file>
 
 <file path=ppt/slides/slide10.xml><?xml version="1.0" encoding="utf-8"?>
+<p:sld xmlns:a="http://schemas.openxmlformats.org/drawingml/2006/main" xmlns:r="http://schemas.openxmlformats.org/officeDocument/2006/relationships" xmlns:p="http://schemas.openxmlformats.org/presentationml/2006/main">
+  <p:cSld>
+    <p:spTree>
+      <p:nvGrpSpPr>
+        <p:cNvPr id="1" name=""/>
+        <p:cNvGrpSpPr/>
+        <p:nvPr/>
+      </p:nvGrpSpPr>
+      <p:grpSpPr>
+        <a:xfrm>
+          <a:off x="0" y="0"/>
+          <a:ext cx="0" cy="0"/>
+          <a:chOff x="0" y="0"/>
+          <a:chExt cx="0" cy="0"/>
+        </a:xfrm>
+      </p:grpSpPr>
+      <p:sp>
+        <p:nvSpPr>
+          <p:cNvPr id="2" name="Title 1"/>
+          <p:cNvSpPr>
+            <a:spLocks noGrp="1"/>
+          </p:cNvSpPr>
+          <p:nvPr>
+            <p:ph type="title"/>
+          </p:nvPr>
+        </p:nvSpPr>
+        <p:spPr/>
+        <p:txBody>
+          <a:bodyPr/>
+          <a:lstStyle/>
+          <a:p>
+            <a:r>
+              <a:rPr lang="en-US" dirty="0"/>
+              <a:t>Action Results</a:t>
+            </a:r>
+          </a:p>
+        </p:txBody>
+      </p:sp>
+      <p:sp>
+        <p:nvSpPr>
+          <p:cNvPr id="3" name="Text Placeholder 2"/>
+          <p:cNvSpPr>
+            <a:spLocks noGrp="1"/>
+          </p:cNvSpPr>
+          <p:nvPr>
+            <p:ph type="body" idx="1"/>
+          </p:nvPr>
+        </p:nvSpPr>
+        <p:spPr/>
+        <p:txBody>
+          <a:bodyPr/>
+          <a:lstStyle/>
+          <a:p>
+            <a:r>
+              <a:rPr lang="en-US" dirty="0" err="1"/>
+              <a:t>IHttpActionResult</a:t>
+            </a:r>
+            <a:r>
+              <a:rPr lang="en-US" dirty="0"/>
+              <a:t> encapsulates controller decision</a:t>
+            </a:r>
+          </a:p>
+          <a:p>
+            <a:r>
+              <a:rPr lang="en-US" dirty="0"/>
+              <a:t>Execution of result is later in the MVC pipeline</a:t>
+            </a:r>
+          </a:p>
+        </p:txBody>
+      </p:sp>
+      <p:pic>
+        <p:nvPicPr>
+          <p:cNvPr id="4" name="Picture 3"/>
+          <p:cNvPicPr>
+            <a:picLocks noChangeAspect="1"/>
+          </p:cNvPicPr>
+          <p:nvPr/>
+        </p:nvPicPr>
+        <p:blipFill>
+          <a:blip r:embed="rId2"/>
+          <a:stretch>
+            <a:fillRect/>
+          </a:stretch>
+        </p:blipFill>
+        <p:spPr>
+          <a:xfrm>
+            <a:off x="1990725" y="2895600"/>
+            <a:ext cx="5162550" cy="1419225"/>
+          </a:xfrm>
+          <a:prstGeom prst="rect">
+            <a:avLst/>
+          </a:prstGeom>
+          <a:ln>
+            <a:noFill/>
+          </a:ln>
+          <a:effectLst>
+            <a:outerShdw blurRad="292100" dist="139700" dir="2700000" algn="tl" rotWithShape="0">
+              <a:srgbClr val="333333">
+                <a:alpha val="65000"/>
+              </a:srgbClr>
+            </a:outerShdw>
+          </a:effectLst>
+        </p:spPr>
+      </p:pic>
+    </p:spTree>
+    <p:extLst>
+      <p:ext uri="{BB962C8B-B14F-4D97-AF65-F5344CB8AC3E}">
+        <p14:creationId xmlns:p14="http://schemas.microsoft.com/office/powerpoint/2010/main" val="1123265878"/>
+      </p:ext>
+    </p:extLst>
+  </p:cSld>
+  <p:clrMapOvr>
+    <a:masterClrMapping/>
+  </p:clrMapOvr>
+  <p:transition>
+    <p:fade/>
+  </p:transition>
+</p:sld>
+</file>
+
+<file path=ppt/slides/slide11.xml><?xml version="1.0" encoding="utf-8"?>
 <p:sld xmlns:a="http://schemas.openxmlformats.org/drawingml/2006/main" xmlns:r="http://schemas.openxmlformats.org/officeDocument/2006/relationships" xmlns:p="http://schemas.openxmlformats.org/presentationml/2006/main">
   <p:cSld>
     <p:spTree>
@@ -3081,7 +3204,7 @@
 </p:sld>
 </file>
 
-<file path=ppt/slides/slide11.xml><?xml version="1.0" encoding="utf-8"?>
+<file path=ppt/slides/slide12.xml><?xml version="1.0" encoding="utf-8"?>
 <p:sld xmlns:a="http://schemas.openxmlformats.org/drawingml/2006/main" xmlns:r="http://schemas.openxmlformats.org/officeDocument/2006/relationships" xmlns:p="http://schemas.openxmlformats.org/presentationml/2006/main">
   <p:cSld>
     <p:spTree>
@@ -3198,7 +3321,7 @@
 </p:sld>
 </file>
 
-<file path=ppt/slides/slide12.xml><?xml version="1.0" encoding="utf-8"?>
+<file path=ppt/slides/slide13.xml><?xml version="1.0" encoding="utf-8"?>
 <p:sld xmlns:a="http://schemas.openxmlformats.org/drawingml/2006/main" xmlns:r="http://schemas.openxmlformats.org/officeDocument/2006/relationships" xmlns:p="http://schemas.openxmlformats.org/presentationml/2006/main">
   <p:cSld>
     <p:spTree>
@@ -3314,7 +3437,7 @@
 </p:sld>
 </file>
 
-<file path=ppt/slides/slide13.xml><?xml version="1.0" encoding="utf-8"?>
+<file path=ppt/slides/slide14.xml><?xml version="1.0" encoding="utf-8"?>
 <p:sld xmlns:a="http://schemas.openxmlformats.org/drawingml/2006/main" xmlns:r="http://schemas.openxmlformats.org/officeDocument/2006/relationships" xmlns:p="http://schemas.openxmlformats.org/presentationml/2006/main">
   <p:cSld>
     <p:spTree>
@@ -3425,7 +3548,7 @@
 </p:sld>
 </file>
 
-<file path=ppt/slides/slide14.xml><?xml version="1.0" encoding="utf-8"?>
+<file path=ppt/slides/slide15.xml><?xml version="1.0" encoding="utf-8"?>
 <p:sld xmlns:a="http://schemas.openxmlformats.org/drawingml/2006/main" xmlns:r="http://schemas.openxmlformats.org/officeDocument/2006/relationships" xmlns:p="http://schemas.openxmlformats.org/presentationml/2006/main">
   <p:cSld>
     <p:spTree>
@@ -3536,7 +3659,7 @@
 </p:sld>
 </file>
 
-<file path=ppt/slides/slide15.xml><?xml version="1.0" encoding="utf-8"?>
+<file path=ppt/slides/slide16.xml><?xml version="1.0" encoding="utf-8"?>
 <p:sld xmlns:a="http://schemas.openxmlformats.org/drawingml/2006/main" xmlns:r="http://schemas.openxmlformats.org/officeDocument/2006/relationships" xmlns:p="http://schemas.openxmlformats.org/presentationml/2006/main">
   <p:cSld>
     <p:spTree>
@@ -3661,7 +3784,7 @@
 </p:sld>
 </file>
 
-<file path=ppt/slides/slide16.xml><?xml version="1.0" encoding="utf-8"?>
+<file path=ppt/slides/slide17.xml><?xml version="1.0" encoding="utf-8"?>
 <p:sld xmlns:a="http://schemas.openxmlformats.org/drawingml/2006/main" xmlns:r="http://schemas.openxmlformats.org/officeDocument/2006/relationships" xmlns:p="http://schemas.openxmlformats.org/presentationml/2006/main">
   <p:cSld>
     <p:spTree>
@@ -3763,7 +3886,7 @@
 </p:sld>
 </file>
 
-<file path=ppt/slides/slide17.xml><?xml version="1.0" encoding="utf-8"?>
+<file path=ppt/slides/slide18.xml><?xml version="1.0" encoding="utf-8"?>
 <p:sld xmlns:a="http://schemas.openxmlformats.org/drawingml/2006/main" xmlns:r="http://schemas.openxmlformats.org/officeDocument/2006/relationships" xmlns:p="http://schemas.openxmlformats.org/presentationml/2006/main">
   <p:cSld>
     <p:spTree>
@@ -5285,6 +5408,92 @@
       </p:grpSpPr>
       <p:sp>
         <p:nvSpPr>
+          <p:cNvPr id="2" name="Title 1">
+            <a:extLst>
+              <a:ext uri="{FF2B5EF4-FFF2-40B4-BE49-F238E27FC236}">
+                <a16:creationId xmlns:a16="http://schemas.microsoft.com/office/drawing/2014/main" id="{7D8495A2-5E83-424F-80DC-FCDA7E492A5D}"/>
+              </a:ext>
+            </a:extLst>
+          </p:cNvPr>
+          <p:cNvSpPr>
+            <a:spLocks noGrp="1"/>
+          </p:cNvSpPr>
+          <p:nvPr>
+            <p:ph type="title"/>
+          </p:nvPr>
+        </p:nvSpPr>
+        <p:spPr/>
+        <p:txBody>
+          <a:bodyPr/>
+          <a:lstStyle/>
+          <a:p>
+            <a:r>
+              <a:rPr lang="en-US" dirty="0"/>
+              <a:t>The Faces of ASP.NET Core</a:t>
+            </a:r>
+          </a:p>
+        </p:txBody>
+      </p:sp>
+      <p:sp>
+        <p:nvSpPr>
+          <p:cNvPr id="3" name="Text Placeholder 2">
+            <a:extLst>
+              <a:ext uri="{FF2B5EF4-FFF2-40B4-BE49-F238E27FC236}">
+                <a16:creationId xmlns:a16="http://schemas.microsoft.com/office/drawing/2014/main" id="{6F433F31-402E-4A76-81AE-63AA4628D9CE}"/>
+              </a:ext>
+            </a:extLst>
+          </p:cNvPr>
+          <p:cNvSpPr>
+            <a:spLocks noGrp="1"/>
+          </p:cNvSpPr>
+          <p:nvPr>
+            <p:ph type="body" idx="1"/>
+          </p:nvPr>
+        </p:nvSpPr>
+        <p:spPr/>
+        <p:txBody>
+          <a:bodyPr/>
+          <a:lstStyle/>
+          <a:p>
+            <a:endParaRPr lang="en-US"/>
+          </a:p>
+        </p:txBody>
+      </p:sp>
+    </p:spTree>
+    <p:extLst>
+      <p:ext uri="{BB962C8B-B14F-4D97-AF65-F5344CB8AC3E}">
+        <p14:creationId xmlns:p14="http://schemas.microsoft.com/office/powerpoint/2010/main" val="3845968289"/>
+      </p:ext>
+    </p:extLst>
+  </p:cSld>
+  <p:clrMapOvr>
+    <a:masterClrMapping/>
+  </p:clrMapOvr>
+  <p:transition>
+    <p:fade/>
+  </p:transition>
+</p:sld>
+</file>
+
+<file path=ppt/slides/slide4.xml><?xml version="1.0" encoding="utf-8"?>
+<p:sld xmlns:a="http://schemas.openxmlformats.org/drawingml/2006/main" xmlns:r="http://schemas.openxmlformats.org/officeDocument/2006/relationships" xmlns:p="http://schemas.openxmlformats.org/presentationml/2006/main">
+  <p:cSld>
+    <p:spTree>
+      <p:nvGrpSpPr>
+        <p:cNvPr id="1" name=""/>
+        <p:cNvGrpSpPr/>
+        <p:nvPr/>
+      </p:nvGrpSpPr>
+      <p:grpSpPr>
+        <a:xfrm>
+          <a:off x="0" y="0"/>
+          <a:ext cx="0" cy="0"/>
+          <a:chOff x="0" y="0"/>
+          <a:chExt cx="0" cy="0"/>
+        </a:xfrm>
+      </p:grpSpPr>
+      <p:sp>
+        <p:nvSpPr>
           <p:cNvPr id="2" name="Title 1"/>
           <p:cNvSpPr>
             <a:spLocks noGrp="1"/>
@@ -5386,7 +5595,7 @@
 </p:sld>
 </file>
 
-<file path=ppt/slides/slide4.xml><?xml version="1.0" encoding="utf-8"?>
+<file path=ppt/slides/slide5.xml><?xml version="1.0" encoding="utf-8"?>
 <p:sld xmlns:a="http://schemas.openxmlformats.org/drawingml/2006/main" xmlns:r="http://schemas.openxmlformats.org/officeDocument/2006/relationships" xmlns:p="http://schemas.openxmlformats.org/presentationml/2006/main">
   <p:cSld>
     <p:spTree>
@@ -5509,7 +5718,7 @@
 </p:sld>
 </file>
 
-<file path=ppt/slides/slide5.xml><?xml version="1.0" encoding="utf-8"?>
+<file path=ppt/slides/slide6.xml><?xml version="1.0" encoding="utf-8"?>
 <p:sld xmlns:a="http://schemas.openxmlformats.org/drawingml/2006/main" xmlns:r="http://schemas.openxmlformats.org/officeDocument/2006/relationships" xmlns:p="http://schemas.openxmlformats.org/presentationml/2006/main">
   <p:cSld>
     <p:spTree>
@@ -5625,7 +5834,7 @@
 </p:sld>
 </file>
 
-<file path=ppt/slides/slide6.xml><?xml version="1.0" encoding="utf-8"?>
+<file path=ppt/slides/slide7.xml><?xml version="1.0" encoding="utf-8"?>
 <p:sld xmlns:a="http://schemas.openxmlformats.org/drawingml/2006/main" xmlns:r="http://schemas.openxmlformats.org/officeDocument/2006/relationships" xmlns:p="http://schemas.openxmlformats.org/presentationml/2006/main">
   <p:cSld>
     <p:spTree>
@@ -5732,7 +5941,7 @@
 </p:sld>
 </file>
 
-<file path=ppt/slides/slide7.xml><?xml version="1.0" encoding="utf-8"?>
+<file path=ppt/slides/slide8.xml><?xml version="1.0" encoding="utf-8"?>
 <p:sld xmlns:a="http://schemas.openxmlformats.org/drawingml/2006/main" xmlns:r="http://schemas.openxmlformats.org/officeDocument/2006/relationships" xmlns:p="http://schemas.openxmlformats.org/presentationml/2006/main">
   <p:cSld>
     <p:spTree>
@@ -5833,7 +6042,7 @@
 </p:sld>
 </file>
 
-<file path=ppt/slides/slide8.xml><?xml version="1.0" encoding="utf-8"?>
+<file path=ppt/slides/slide9.xml><?xml version="1.0" encoding="utf-8"?>
 <p:sld xmlns:a="http://schemas.openxmlformats.org/drawingml/2006/main" xmlns:r="http://schemas.openxmlformats.org/officeDocument/2006/relationships" xmlns:p="http://schemas.openxmlformats.org/presentationml/2006/main">
   <p:cSld>
     <p:spTree>
@@ -5936,127 +6145,6 @@
     <p:extLst>
       <p:ext uri="{BB962C8B-B14F-4D97-AF65-F5344CB8AC3E}">
         <p14:creationId xmlns:p14="http://schemas.microsoft.com/office/powerpoint/2010/main" val="4024629764"/>
-      </p:ext>
-    </p:extLst>
-  </p:cSld>
-  <p:clrMapOvr>
-    <a:masterClrMapping/>
-  </p:clrMapOvr>
-  <p:transition>
-    <p:fade/>
-  </p:transition>
-</p:sld>
-</file>
-
-<file path=ppt/slides/slide9.xml><?xml version="1.0" encoding="utf-8"?>
-<p:sld xmlns:a="http://schemas.openxmlformats.org/drawingml/2006/main" xmlns:r="http://schemas.openxmlformats.org/officeDocument/2006/relationships" xmlns:p="http://schemas.openxmlformats.org/presentationml/2006/main">
-  <p:cSld>
-    <p:spTree>
-      <p:nvGrpSpPr>
-        <p:cNvPr id="1" name=""/>
-        <p:cNvGrpSpPr/>
-        <p:nvPr/>
-      </p:nvGrpSpPr>
-      <p:grpSpPr>
-        <a:xfrm>
-          <a:off x="0" y="0"/>
-          <a:ext cx="0" cy="0"/>
-          <a:chOff x="0" y="0"/>
-          <a:chExt cx="0" cy="0"/>
-        </a:xfrm>
-      </p:grpSpPr>
-      <p:sp>
-        <p:nvSpPr>
-          <p:cNvPr id="2" name="Title 1"/>
-          <p:cNvSpPr>
-            <a:spLocks noGrp="1"/>
-          </p:cNvSpPr>
-          <p:nvPr>
-            <p:ph type="title"/>
-          </p:nvPr>
-        </p:nvSpPr>
-        <p:spPr/>
-        <p:txBody>
-          <a:bodyPr/>
-          <a:lstStyle/>
-          <a:p>
-            <a:r>
-              <a:rPr lang="en-US" dirty="0"/>
-              <a:t>Action Results</a:t>
-            </a:r>
-          </a:p>
-        </p:txBody>
-      </p:sp>
-      <p:sp>
-        <p:nvSpPr>
-          <p:cNvPr id="3" name="Text Placeholder 2"/>
-          <p:cNvSpPr>
-            <a:spLocks noGrp="1"/>
-          </p:cNvSpPr>
-          <p:nvPr>
-            <p:ph type="body" idx="1"/>
-          </p:nvPr>
-        </p:nvSpPr>
-        <p:spPr/>
-        <p:txBody>
-          <a:bodyPr/>
-          <a:lstStyle/>
-          <a:p>
-            <a:r>
-              <a:rPr lang="en-US" dirty="0" err="1"/>
-              <a:t>IHttpActionResult</a:t>
-            </a:r>
-            <a:r>
-              <a:rPr lang="en-US" dirty="0"/>
-              <a:t> encapsulates controller decision</a:t>
-            </a:r>
-          </a:p>
-          <a:p>
-            <a:r>
-              <a:rPr lang="en-US" dirty="0"/>
-              <a:t>Execution of result is later in the MVC pipeline</a:t>
-            </a:r>
-          </a:p>
-        </p:txBody>
-      </p:sp>
-      <p:pic>
-        <p:nvPicPr>
-          <p:cNvPr id="4" name="Picture 3"/>
-          <p:cNvPicPr>
-            <a:picLocks noChangeAspect="1"/>
-          </p:cNvPicPr>
-          <p:nvPr/>
-        </p:nvPicPr>
-        <p:blipFill>
-          <a:blip r:embed="rId2"/>
-          <a:stretch>
-            <a:fillRect/>
-          </a:stretch>
-        </p:blipFill>
-        <p:spPr>
-          <a:xfrm>
-            <a:off x="1990725" y="2895600"/>
-            <a:ext cx="5162550" cy="1419225"/>
-          </a:xfrm>
-          <a:prstGeom prst="rect">
-            <a:avLst/>
-          </a:prstGeom>
-          <a:ln>
-            <a:noFill/>
-          </a:ln>
-          <a:effectLst>
-            <a:outerShdw blurRad="292100" dist="139700" dir="2700000" algn="tl" rotWithShape="0">
-              <a:srgbClr val="333333">
-                <a:alpha val="65000"/>
-              </a:srgbClr>
-            </a:outerShdw>
-          </a:effectLst>
-        </p:spPr>
-      </p:pic>
-    </p:spTree>
-    <p:extLst>
-      <p:ext uri="{BB962C8B-B14F-4D97-AF65-F5344CB8AC3E}">
-        <p14:creationId xmlns:p14="http://schemas.microsoft.com/office/powerpoint/2010/main" val="1123265878"/>
       </p:ext>
     </p:extLst>
   </p:cSld>

</xml_diff>